<commit_message>
started script for presentation
</commit_message>
<xml_diff>
--- a/documents/figures/diagrams.pptx
+++ b/documents/figures/diagrams.pptx
@@ -5,10 +5,11 @@
     <p:sldMasterId id="2147483648" r:id="rId1"/>
   </p:sldMasterIdLst>
   <p:handoutMasterIdLst>
-    <p:handoutMasterId r:id="rId3"/>
+    <p:handoutMasterId r:id="rId4"/>
   </p:handoutMasterIdLst>
   <p:sldIdLst>
     <p:sldId id="256" r:id="rId2"/>
+    <p:sldId id="257" r:id="rId3"/>
   </p:sldIdLst>
   <p:sldSz cx="36576000" cy="27432000"/>
   <p:notesSz cx="6858000" cy="9144000"/>
@@ -3611,8 +3612,8 @@
           </a:fontRef>
         </p:style>
       </p:cxnSp>
-      <mc:AlternateContent xmlns:mc="http://schemas.openxmlformats.org/markup-compatibility/2006">
-        <mc:Choice xmlns:a14="http://schemas.microsoft.com/office/drawing/2010/main" Requires="a14">
+      <mc:AlternateContent xmlns:mc="http://schemas.openxmlformats.org/markup-compatibility/2006" xmlns:a14="http://schemas.microsoft.com/office/drawing/2010/main">
+        <mc:Choice Requires="a14">
           <p:sp>
             <p:nvSpPr>
               <p:cNvPr id="9" name="TextBox 8">
@@ -3641,6 +3642,7 @@
               </a:bodyPr>
               <a:lstStyle/>
               <a:p>
+                <a:pPr/>
                 <a14:m>
                   <m:oMathPara xmlns:m="http://schemas.openxmlformats.org/officeDocument/2006/math">
                     <m:oMathParaPr>
@@ -3680,7 +3682,7 @@
             </p:txBody>
           </p:sp>
         </mc:Choice>
-        <mc:Fallback>
+        <mc:Fallback xmlns="">
           <p:sp>
             <p:nvSpPr>
               <p:cNvPr id="9" name="TextBox 8">
@@ -3725,8 +3727,8 @@
           </p:sp>
         </mc:Fallback>
       </mc:AlternateContent>
-      <mc:AlternateContent xmlns:mc="http://schemas.openxmlformats.org/markup-compatibility/2006">
-        <mc:Choice xmlns:a14="http://schemas.microsoft.com/office/drawing/2010/main" Requires="a14">
+      <mc:AlternateContent xmlns:mc="http://schemas.openxmlformats.org/markup-compatibility/2006" xmlns:a14="http://schemas.microsoft.com/office/drawing/2010/main">
+        <mc:Choice Requires="a14">
           <p:sp>
             <p:nvSpPr>
               <p:cNvPr id="10" name="TextBox 9">
@@ -3755,6 +3757,7 @@
               </a:bodyPr>
               <a:lstStyle/>
               <a:p>
+                <a:pPr/>
                 <a14:m>
                   <m:oMathPara xmlns:m="http://schemas.openxmlformats.org/officeDocument/2006/math">
                     <m:oMathParaPr>
@@ -3794,7 +3797,7 @@
             </p:txBody>
           </p:sp>
         </mc:Choice>
-        <mc:Fallback>
+        <mc:Fallback xmlns="">
           <p:sp>
             <p:nvSpPr>
               <p:cNvPr id="10" name="TextBox 9">
@@ -3883,8 +3886,8 @@
           </a:fontRef>
         </p:style>
       </p:cxnSp>
-      <mc:AlternateContent xmlns:mc="http://schemas.openxmlformats.org/markup-compatibility/2006">
-        <mc:Choice xmlns:a14="http://schemas.microsoft.com/office/drawing/2010/main" Requires="a14">
+      <mc:AlternateContent xmlns:mc="http://schemas.openxmlformats.org/markup-compatibility/2006" xmlns:a14="http://schemas.microsoft.com/office/drawing/2010/main">
+        <mc:Choice Requires="a14">
           <p:sp>
             <p:nvSpPr>
               <p:cNvPr id="15" name="TextBox 14">
@@ -3913,6 +3916,7 @@
               </a:bodyPr>
               <a:lstStyle/>
               <a:p>
+                <a:pPr/>
                 <a14:m>
                   <m:oMathPara xmlns:m="http://schemas.openxmlformats.org/officeDocument/2006/math">
                     <m:oMathParaPr>
@@ -3952,7 +3956,7 @@
             </p:txBody>
           </p:sp>
         </mc:Choice>
-        <mc:Fallback>
+        <mc:Fallback xmlns="">
           <p:sp>
             <p:nvSpPr>
               <p:cNvPr id="15" name="TextBox 14">
@@ -4097,8 +4101,8 @@
           </a:p>
         </p:txBody>
       </p:sp>
-      <mc:AlternateContent xmlns:mc="http://schemas.openxmlformats.org/markup-compatibility/2006">
-        <mc:Choice xmlns:a14="http://schemas.microsoft.com/office/drawing/2010/main" Requires="a14">
+      <mc:AlternateContent xmlns:mc="http://schemas.openxmlformats.org/markup-compatibility/2006" xmlns:a14="http://schemas.microsoft.com/office/drawing/2010/main">
+        <mc:Choice Requires="a14">
           <p:sp>
             <p:nvSpPr>
               <p:cNvPr id="30" name="TextBox 29">
@@ -4127,6 +4131,7 @@
               </a:bodyPr>
               <a:lstStyle/>
               <a:p>
+                <a:pPr/>
                 <a14:m>
                   <m:oMathPara xmlns:m="http://schemas.openxmlformats.org/officeDocument/2006/math">
                     <m:oMathParaPr>
@@ -4147,7 +4152,7 @@
             </p:txBody>
           </p:sp>
         </mc:Choice>
-        <mc:Fallback>
+        <mc:Fallback xmlns="">
           <p:sp>
             <p:nvSpPr>
               <p:cNvPr id="30" name="TextBox 29">
@@ -4304,8 +4309,8 @@
           </a:p>
         </p:txBody>
       </p:sp>
-      <mc:AlternateContent xmlns:mc="http://schemas.openxmlformats.org/markup-compatibility/2006">
-        <mc:Choice xmlns:a14="http://schemas.microsoft.com/office/drawing/2010/main" Requires="a14">
+      <mc:AlternateContent xmlns:mc="http://schemas.openxmlformats.org/markup-compatibility/2006" xmlns:a14="http://schemas.microsoft.com/office/drawing/2010/main">
+        <mc:Choice Requires="a14">
           <p:sp>
             <p:nvSpPr>
               <p:cNvPr id="33" name="TextBox 32">
@@ -4337,6 +4342,7 @@
               </a:bodyPr>
               <a:lstStyle/>
               <a:p>
+                <a:pPr/>
                 <a14:m>
                   <m:oMathPara xmlns:m="http://schemas.openxmlformats.org/officeDocument/2006/math">
                     <m:oMathParaPr>
@@ -4364,7 +4370,7 @@
             </p:txBody>
           </p:sp>
         </mc:Choice>
-        <mc:Fallback>
+        <mc:Fallback xmlns="">
           <p:sp>
             <p:nvSpPr>
               <p:cNvPr id="33" name="TextBox 32">
@@ -4412,8 +4418,8 @@
           </p:sp>
         </mc:Fallback>
       </mc:AlternateContent>
-      <mc:AlternateContent xmlns:mc="http://schemas.openxmlformats.org/markup-compatibility/2006">
-        <mc:Choice xmlns:a14="http://schemas.microsoft.com/office/drawing/2010/main" Requires="a14">
+      <mc:AlternateContent xmlns:mc="http://schemas.openxmlformats.org/markup-compatibility/2006" xmlns:a14="http://schemas.microsoft.com/office/drawing/2010/main">
+        <mc:Choice Requires="a14">
           <p:sp>
             <p:nvSpPr>
               <p:cNvPr id="34" name="TextBox 33">
@@ -4445,6 +4451,7 @@
               </a:bodyPr>
               <a:lstStyle/>
               <a:p>
+                <a:pPr/>
                 <a14:m>
                   <m:oMathPara xmlns:m="http://schemas.openxmlformats.org/officeDocument/2006/math">
                     <m:oMathParaPr>
@@ -4472,7 +4479,7 @@
             </p:txBody>
           </p:sp>
         </mc:Choice>
-        <mc:Fallback>
+        <mc:Fallback xmlns="">
           <p:sp>
             <p:nvSpPr>
               <p:cNvPr id="34" name="TextBox 33">
@@ -4600,8 +4607,8 @@
           </a:fontRef>
         </p:style>
       </p:cxnSp>
-      <mc:AlternateContent xmlns:mc="http://schemas.openxmlformats.org/markup-compatibility/2006">
-        <mc:Choice xmlns:a14="http://schemas.microsoft.com/office/drawing/2010/main" Requires="a14">
+      <mc:AlternateContent xmlns:mc="http://schemas.openxmlformats.org/markup-compatibility/2006" xmlns:a14="http://schemas.microsoft.com/office/drawing/2010/main">
+        <mc:Choice Requires="a14">
           <p:sp>
             <p:nvSpPr>
               <p:cNvPr id="43" name="TextBox 42">
@@ -4630,6 +4637,7 @@
               </a:bodyPr>
               <a:lstStyle/>
               <a:p>
+                <a:pPr/>
                 <a14:m>
                   <m:oMathPara xmlns:m="http://schemas.openxmlformats.org/officeDocument/2006/math">
                     <m:oMathParaPr>
@@ -4669,7 +4677,7 @@
             </p:txBody>
           </p:sp>
         </mc:Choice>
-        <mc:Fallback>
+        <mc:Fallback xmlns="">
           <p:sp>
             <p:nvSpPr>
               <p:cNvPr id="43" name="TextBox 42">
@@ -4714,8 +4722,8 @@
           </p:sp>
         </mc:Fallback>
       </mc:AlternateContent>
-      <mc:AlternateContent xmlns:mc="http://schemas.openxmlformats.org/markup-compatibility/2006">
-        <mc:Choice xmlns:a14="http://schemas.microsoft.com/office/drawing/2010/main" Requires="a14">
+      <mc:AlternateContent xmlns:mc="http://schemas.openxmlformats.org/markup-compatibility/2006" xmlns:a14="http://schemas.microsoft.com/office/drawing/2010/main">
+        <mc:Choice Requires="a14">
           <p:sp>
             <p:nvSpPr>
               <p:cNvPr id="44" name="TextBox 43">
@@ -4744,6 +4752,7 @@
               </a:bodyPr>
               <a:lstStyle/>
               <a:p>
+                <a:pPr/>
                 <a14:m>
                   <m:oMathPara xmlns:m="http://schemas.openxmlformats.org/officeDocument/2006/math">
                     <m:oMathParaPr>
@@ -4783,7 +4792,7 @@
             </p:txBody>
           </p:sp>
         </mc:Choice>
-        <mc:Fallback>
+        <mc:Fallback xmlns="">
           <p:sp>
             <p:nvSpPr>
               <p:cNvPr id="44" name="TextBox 43">
@@ -4872,8 +4881,8 @@
           </a:fontRef>
         </p:style>
       </p:cxnSp>
-      <mc:AlternateContent xmlns:mc="http://schemas.openxmlformats.org/markup-compatibility/2006">
-        <mc:Choice xmlns:a14="http://schemas.microsoft.com/office/drawing/2010/main" Requires="a14">
+      <mc:AlternateContent xmlns:mc="http://schemas.openxmlformats.org/markup-compatibility/2006" xmlns:a14="http://schemas.microsoft.com/office/drawing/2010/main">
+        <mc:Choice Requires="a14">
           <p:sp>
             <p:nvSpPr>
               <p:cNvPr id="46" name="TextBox 45">
@@ -4902,6 +4911,7 @@
               </a:bodyPr>
               <a:lstStyle/>
               <a:p>
+                <a:pPr/>
                 <a14:m>
                   <m:oMathPara xmlns:m="http://schemas.openxmlformats.org/officeDocument/2006/math">
                     <m:oMathParaPr>
@@ -4941,7 +4951,7 @@
             </p:txBody>
           </p:sp>
         </mc:Choice>
-        <mc:Fallback>
+        <mc:Fallback xmlns="">
           <p:sp>
             <p:nvSpPr>
               <p:cNvPr id="46" name="TextBox 45">
@@ -5086,8 +5096,8 @@
           </a:p>
         </p:txBody>
       </p:sp>
-      <mc:AlternateContent xmlns:mc="http://schemas.openxmlformats.org/markup-compatibility/2006">
-        <mc:Choice xmlns:a14="http://schemas.microsoft.com/office/drawing/2010/main" Requires="a14">
+      <mc:AlternateContent xmlns:mc="http://schemas.openxmlformats.org/markup-compatibility/2006" xmlns:a14="http://schemas.microsoft.com/office/drawing/2010/main">
+        <mc:Choice Requires="a14">
           <p:sp>
             <p:nvSpPr>
               <p:cNvPr id="49" name="TextBox 48">
@@ -5116,6 +5126,7 @@
               </a:bodyPr>
               <a:lstStyle/>
               <a:p>
+                <a:pPr/>
                 <a14:m>
                   <m:oMathPara xmlns:m="http://schemas.openxmlformats.org/officeDocument/2006/math">
                     <m:oMathParaPr>
@@ -5136,7 +5147,7 @@
             </p:txBody>
           </p:sp>
         </mc:Choice>
-        <mc:Fallback>
+        <mc:Fallback xmlns="">
           <p:sp>
             <p:nvSpPr>
               <p:cNvPr id="49" name="TextBox 48">
@@ -5330,6 +5341,7 @@
               </a:bodyPr>
               <a:lstStyle/>
               <a:p>
+                <a:pPr/>
                 <a14:m>
                   <m:oMathPara xmlns:m="http://schemas.openxmlformats.org/officeDocument/2006/math">
                     <m:oMathParaPr>
@@ -5405,8 +5417,8 @@
           </p:sp>
         </mc:Fallback>
       </mc:AlternateContent>
-      <mc:AlternateContent xmlns:mc="http://schemas.openxmlformats.org/markup-compatibility/2006">
-        <mc:Choice xmlns:a14="http://schemas.microsoft.com/office/drawing/2010/main" Requires="a14">
+      <mc:AlternateContent xmlns:mc="http://schemas.openxmlformats.org/markup-compatibility/2006" xmlns:a14="http://schemas.microsoft.com/office/drawing/2010/main">
+        <mc:Choice Requires="a14">
           <p:sp>
             <p:nvSpPr>
               <p:cNvPr id="53" name="TextBox 52">
@@ -5438,6 +5450,7 @@
               </a:bodyPr>
               <a:lstStyle/>
               <a:p>
+                <a:pPr/>
                 <a14:m>
                   <m:oMathPara xmlns:m="http://schemas.openxmlformats.org/officeDocument/2006/math">
                     <m:oMathParaPr>
@@ -5465,7 +5478,7 @@
             </p:txBody>
           </p:sp>
         </mc:Choice>
-        <mc:Fallback>
+        <mc:Fallback xmlns="">
           <p:sp>
             <p:nvSpPr>
               <p:cNvPr id="53" name="TextBox 52">
@@ -5517,6 +5530,86 @@
     <p:extLst>
       <p:ext uri="{BB962C8B-B14F-4D97-AF65-F5344CB8AC3E}">
         <p14:creationId xmlns:p14="http://schemas.microsoft.com/office/powerpoint/2010/main" val="3203091447"/>
+      </p:ext>
+    </p:extLst>
+  </p:cSld>
+  <p:clrMapOvr>
+    <a:masterClrMapping/>
+  </p:clrMapOvr>
+</p:sld>
+</file>
+
+<file path=ppt/slides/slide2.xml><?xml version="1.0" encoding="utf-8"?>
+<p:sld xmlns:a="http://schemas.openxmlformats.org/drawingml/2006/main" xmlns:r="http://schemas.openxmlformats.org/officeDocument/2006/relationships" xmlns:p="http://schemas.openxmlformats.org/presentationml/2006/main">
+  <p:cSld>
+    <p:spTree>
+      <p:nvGrpSpPr>
+        <p:cNvPr id="1" name=""/>
+        <p:cNvGrpSpPr/>
+        <p:nvPr/>
+      </p:nvGrpSpPr>
+      <p:grpSpPr>
+        <a:xfrm>
+          <a:off x="0" y="0"/>
+          <a:ext cx="0" cy="0"/>
+          <a:chOff x="0" y="0"/>
+          <a:chExt cx="0" cy="0"/>
+        </a:xfrm>
+      </p:grpSpPr>
+      <p:sp>
+        <p:nvSpPr>
+          <p:cNvPr id="2" name="Title 1">
+            <a:extLst>
+              <a:ext uri="{FF2B5EF4-FFF2-40B4-BE49-F238E27FC236}">
+                <a16:creationId xmlns:a16="http://schemas.microsoft.com/office/drawing/2014/main" id="{8EBDB5F8-0640-4029-95EB-3455EC9CFB23}"/>
+              </a:ext>
+            </a:extLst>
+          </p:cNvPr>
+          <p:cNvSpPr>
+            <a:spLocks noGrp="1"/>
+          </p:cNvSpPr>
+          <p:nvPr>
+            <p:ph type="title"/>
+          </p:nvPr>
+        </p:nvSpPr>
+        <p:spPr/>
+        <p:txBody>
+          <a:bodyPr/>
+          <a:lstStyle/>
+          <a:p>
+            <a:endParaRPr lang="en-US"/>
+          </a:p>
+        </p:txBody>
+      </p:sp>
+      <p:sp>
+        <p:nvSpPr>
+          <p:cNvPr id="11" name="Content Placeholder 10">
+            <a:extLst>
+              <a:ext uri="{FF2B5EF4-FFF2-40B4-BE49-F238E27FC236}">
+                <a16:creationId xmlns:a16="http://schemas.microsoft.com/office/drawing/2014/main" id="{ABE41857-5B3A-413B-9FA3-69EA52CD4E29}"/>
+              </a:ext>
+            </a:extLst>
+          </p:cNvPr>
+          <p:cNvSpPr>
+            <a:spLocks noGrp="1"/>
+          </p:cNvSpPr>
+          <p:nvPr>
+            <p:ph idx="1"/>
+          </p:nvPr>
+        </p:nvSpPr>
+        <p:spPr/>
+        <p:txBody>
+          <a:bodyPr/>
+          <a:lstStyle/>
+          <a:p>
+            <a:endParaRPr lang="en-US"/>
+          </a:p>
+        </p:txBody>
+      </p:sp>
+    </p:spTree>
+    <p:extLst>
+      <p:ext uri="{BB962C8B-B14F-4D97-AF65-F5344CB8AC3E}">
+        <p14:creationId xmlns:p14="http://schemas.microsoft.com/office/powerpoint/2010/main" val="638448712"/>
       </p:ext>
     </p:extLst>
   </p:cSld>

</xml_diff>